<commit_message>
Minor changes to PPT formatting
</commit_message>
<xml_diff>
--- a/mdss_presentation.pptx
+++ b/mdss_presentation.pptx
@@ -115,6 +115,11 @@
       </a:defRPr>
     </a:lvl9pPr>
   </p:defaultTextStyle>
+  <p:extLst>
+    <p:ext uri="{EFAFB233-063F-42B5-8137-9DF3F51BA10A}">
+      <p15:sldGuideLst xmlns:p15="http://schemas.microsoft.com/office/powerpoint/2012/main"/>
+    </p:ext>
+  </p:extLst>
 </p:presentation>
 </file>
 
@@ -1104,7 +1109,7 @@
         <a:p>
           <a:r>
             <a:rPr lang="en-US" sz="1600" dirty="0"/>
-            <a:t>Key takeaways</a:t>
+            <a:t>Key recommendations</a:t>
           </a:r>
         </a:p>
       </dgm:t>
@@ -2000,7 +2005,7 @@
           </a:pPr>
           <a:r>
             <a:rPr lang="en-US" sz="1600" kern="1200" dirty="0"/>
-            <a:t>Key takeaways</a:t>
+            <a:t>Key recommendations</a:t>
           </a:r>
         </a:p>
       </dsp:txBody>
@@ -3363,7 +3368,7 @@
           <a:p>
             <a:fld id="{65D38D0D-4F9B-6742-A7DD-7D25288B01E1}" type="datetimeFigureOut">
               <a:rPr lang="en-US" smtClean="0"/>
-              <a:t>10/9/23</a:t>
+              <a:t>10/10/23</a:t>
             </a:fld>
             <a:endParaRPr lang="en-US"/>
           </a:p>
@@ -3563,7 +3568,7 @@
           <a:p>
             <a:fld id="{65D38D0D-4F9B-6742-A7DD-7D25288B01E1}" type="datetimeFigureOut">
               <a:rPr lang="en-US" smtClean="0"/>
-              <a:t>10/9/23</a:t>
+              <a:t>10/10/23</a:t>
             </a:fld>
             <a:endParaRPr lang="en-US"/>
           </a:p>
@@ -3773,7 +3778,7 @@
           <a:p>
             <a:fld id="{65D38D0D-4F9B-6742-A7DD-7D25288B01E1}" type="datetimeFigureOut">
               <a:rPr lang="en-US" smtClean="0"/>
-              <a:t>10/9/23</a:t>
+              <a:t>10/10/23</a:t>
             </a:fld>
             <a:endParaRPr lang="en-US"/>
           </a:p>
@@ -3973,7 +3978,7 @@
           <a:p>
             <a:fld id="{65D38D0D-4F9B-6742-A7DD-7D25288B01E1}" type="datetimeFigureOut">
               <a:rPr lang="en-US" smtClean="0"/>
-              <a:t>10/9/23</a:t>
+              <a:t>10/10/23</a:t>
             </a:fld>
             <a:endParaRPr lang="en-US"/>
           </a:p>
@@ -4249,7 +4254,7 @@
           <a:p>
             <a:fld id="{65D38D0D-4F9B-6742-A7DD-7D25288B01E1}" type="datetimeFigureOut">
               <a:rPr lang="en-US" smtClean="0"/>
-              <a:t>10/9/23</a:t>
+              <a:t>10/10/23</a:t>
             </a:fld>
             <a:endParaRPr lang="en-US"/>
           </a:p>
@@ -4517,7 +4522,7 @@
           <a:p>
             <a:fld id="{65D38D0D-4F9B-6742-A7DD-7D25288B01E1}" type="datetimeFigureOut">
               <a:rPr lang="en-US" smtClean="0"/>
-              <a:t>10/9/23</a:t>
+              <a:t>10/10/23</a:t>
             </a:fld>
             <a:endParaRPr lang="en-US"/>
           </a:p>
@@ -4932,7 +4937,7 @@
           <a:p>
             <a:fld id="{65D38D0D-4F9B-6742-A7DD-7D25288B01E1}" type="datetimeFigureOut">
               <a:rPr lang="en-US" smtClean="0"/>
-              <a:t>10/9/23</a:t>
+              <a:t>10/10/23</a:t>
             </a:fld>
             <a:endParaRPr lang="en-US"/>
           </a:p>
@@ -5074,7 +5079,7 @@
           <a:p>
             <a:fld id="{65D38D0D-4F9B-6742-A7DD-7D25288B01E1}" type="datetimeFigureOut">
               <a:rPr lang="en-US" smtClean="0"/>
-              <a:t>10/9/23</a:t>
+              <a:t>10/10/23</a:t>
             </a:fld>
             <a:endParaRPr lang="en-US"/>
           </a:p>
@@ -5187,7 +5192,7 @@
           <a:p>
             <a:fld id="{65D38D0D-4F9B-6742-A7DD-7D25288B01E1}" type="datetimeFigureOut">
               <a:rPr lang="en-US" smtClean="0"/>
-              <a:t>10/9/23</a:t>
+              <a:t>10/10/23</a:t>
             </a:fld>
             <a:endParaRPr lang="en-US"/>
           </a:p>
@@ -5500,7 +5505,7 @@
           <a:p>
             <a:fld id="{65D38D0D-4F9B-6742-A7DD-7D25288B01E1}" type="datetimeFigureOut">
               <a:rPr lang="en-US" smtClean="0"/>
-              <a:t>10/9/23</a:t>
+              <a:t>10/10/23</a:t>
             </a:fld>
             <a:endParaRPr lang="en-US"/>
           </a:p>
@@ -5789,7 +5794,7 @@
           <a:p>
             <a:fld id="{65D38D0D-4F9B-6742-A7DD-7D25288B01E1}" type="datetimeFigureOut">
               <a:rPr lang="en-US" smtClean="0"/>
-              <a:t>10/9/23</a:t>
+              <a:t>10/10/23</a:t>
             </a:fld>
             <a:endParaRPr lang="en-US"/>
           </a:p>
@@ -6032,7 +6037,7 @@
           <a:p>
             <a:fld id="{65D38D0D-4F9B-6742-A7DD-7D25288B01E1}" type="datetimeFigureOut">
               <a:rPr lang="en-US" smtClean="0"/>
-              <a:t>10/9/23</a:t>
+              <a:t>10/10/23</a:t>
             </a:fld>
             <a:endParaRPr lang="en-US"/>
           </a:p>
@@ -6735,6 +6740,14 @@
 <file path=ppt/slides/slide11.xml><?xml version="1.0" encoding="utf-8"?>
 <p:sld xmlns:a="http://schemas.openxmlformats.org/drawingml/2006/main" xmlns:r="http://schemas.openxmlformats.org/officeDocument/2006/relationships" xmlns:p="http://schemas.openxmlformats.org/presentationml/2006/main">
   <p:cSld>
+    <p:bg>
+      <p:bgPr>
+        <a:solidFill>
+          <a:schemeClr val="bg1"/>
+        </a:solidFill>
+        <a:effectLst/>
+      </p:bgPr>
+    </p:bg>
     <p:spTree>
       <p:nvGrpSpPr>
         <p:cNvPr id="1" name=""/>
@@ -6749,6 +6762,337 @@
           <a:chExt cx="0" cy="0"/>
         </a:xfrm>
       </p:grpSpPr>
+      <p:grpSp>
+        <p:nvGrpSpPr>
+          <p:cNvPr id="27" name="Group 26">
+            <a:extLst>
+              <a:ext uri="{FF2B5EF4-FFF2-40B4-BE49-F238E27FC236}">
+                <a16:creationId xmlns:a16="http://schemas.microsoft.com/office/drawing/2014/main" id="{114ED94A-C85D-4CD3-4205-438D21CE6B38}"/>
+              </a:ext>
+              <a:ext uri="{C183D7F6-B498-43B3-948B-1728B52AA6E4}">
+                <adec:decorative xmlns:adec="http://schemas.microsoft.com/office/drawing/2017/decorative" val="1"/>
+              </a:ext>
+            </a:extLst>
+          </p:cNvPr>
+          <p:cNvGrpSpPr>
+            <a:grpSpLocks noGrp="1" noUngrp="1" noRot="1" noChangeAspect="1" noMove="1" noResize="1"/>
+          </p:cNvGrpSpPr>
+          <p:nvPr>
+            <p:extLst>
+              <p:ext uri="{386F3935-93C4-4BCD-93E2-E3B085C9AB24}">
+                <p16:designElem xmlns:p16="http://schemas.microsoft.com/office/powerpoint/2015/main" val="1"/>
+              </p:ext>
+            </p:extLst>
+          </p:nvPr>
+        </p:nvGrpSpPr>
+        <p:grpSpPr>
+          <a:xfrm>
+            <a:off x="-19217" y="-1"/>
+            <a:ext cx="5213267" cy="6883030"/>
+            <a:chOff x="-19217" y="-1"/>
+            <a:chExt cx="5213267" cy="6883030"/>
+          </a:xfrm>
+        </p:grpSpPr>
+        <p:sp>
+          <p:nvSpPr>
+            <p:cNvPr id="14" name="Rectangle 13">
+              <a:extLst>
+                <a:ext uri="{FF2B5EF4-FFF2-40B4-BE49-F238E27FC236}">
+                  <a16:creationId xmlns:a16="http://schemas.microsoft.com/office/drawing/2014/main" id="{E642BDB2-BF67-1D53-1C70-0B41D709E485}"/>
+                </a:ext>
+                <a:ext uri="{C183D7F6-B498-43B3-948B-1728B52AA6E4}">
+                  <adec:decorative xmlns:adec="http://schemas.microsoft.com/office/drawing/2017/decorative" val="1"/>
+                </a:ext>
+              </a:extLst>
+            </p:cNvPr>
+            <p:cNvSpPr/>
+            <p:nvPr>
+              <p:extLst>
+                <p:ext uri="{386F3935-93C4-4BCD-93E2-E3B085C9AB24}">
+                  <p16:designElem xmlns:p16="http://schemas.microsoft.com/office/powerpoint/2015/main" val="1"/>
+                </p:ext>
+              </p:extLst>
+            </p:nvPr>
+          </p:nvSpPr>
+          <p:spPr>
+            <a:xfrm>
+              <a:off x="-19206" y="0"/>
+              <a:ext cx="5204956" cy="6883029"/>
+            </a:xfrm>
+            <a:prstGeom prst="rect">
+              <a:avLst/>
+            </a:prstGeom>
+            <a:gradFill>
+              <a:gsLst>
+                <a:gs pos="7000">
+                  <a:schemeClr val="accent2"/>
+                </a:gs>
+                <a:gs pos="100000">
+                  <a:schemeClr val="accent5"/>
+                </a:gs>
+              </a:gsLst>
+              <a:lin ang="4200000" scaled="0"/>
+            </a:gradFill>
+            <a:ln>
+              <a:noFill/>
+            </a:ln>
+          </p:spPr>
+          <p:style>
+            <a:lnRef idx="2">
+              <a:schemeClr val="accent1">
+                <a:shade val="50000"/>
+              </a:schemeClr>
+            </a:lnRef>
+            <a:fillRef idx="1">
+              <a:schemeClr val="accent1"/>
+            </a:fillRef>
+            <a:effectRef idx="0">
+              <a:schemeClr val="accent1"/>
+            </a:effectRef>
+            <a:fontRef idx="minor">
+              <a:schemeClr val="lt1"/>
+            </a:fontRef>
+          </p:style>
+          <p:txBody>
+            <a:bodyPr rtlCol="0" anchor="ctr"/>
+            <a:lstStyle/>
+            <a:p>
+              <a:pPr algn="ctr"/>
+              <a:endParaRPr lang="en-US"/>
+            </a:p>
+          </p:txBody>
+        </p:sp>
+        <p:sp>
+          <p:nvSpPr>
+            <p:cNvPr id="28" name="Rectangle 27">
+              <a:extLst>
+                <a:ext uri="{FF2B5EF4-FFF2-40B4-BE49-F238E27FC236}">
+                  <a16:creationId xmlns:a16="http://schemas.microsoft.com/office/drawing/2014/main" id="{58E0D8CE-5DBF-B664-EB48-C29BF8AB48E1}"/>
+                </a:ext>
+                <a:ext uri="{C183D7F6-B498-43B3-948B-1728B52AA6E4}">
+                  <adec:decorative xmlns:adec="http://schemas.microsoft.com/office/drawing/2017/decorative" val="1"/>
+                </a:ext>
+              </a:extLst>
+            </p:cNvPr>
+            <p:cNvSpPr/>
+            <p:nvPr>
+              <p:extLst>
+                <p:ext uri="{386F3935-93C4-4BCD-93E2-E3B085C9AB24}">
+                  <p16:designElem xmlns:p16="http://schemas.microsoft.com/office/powerpoint/2015/main" val="1"/>
+                </p:ext>
+              </p:extLst>
+            </p:nvPr>
+          </p:nvSpPr>
+          <p:spPr>
+            <a:xfrm rot="10800000">
+              <a:off x="-19217" y="1731909"/>
+              <a:ext cx="5204963" cy="5144400"/>
+            </a:xfrm>
+            <a:prstGeom prst="rect">
+              <a:avLst/>
+            </a:prstGeom>
+            <a:gradFill flip="none" rotWithShape="1">
+              <a:gsLst>
+                <a:gs pos="0">
+                  <a:schemeClr val="accent5">
+                    <a:lumMod val="75000"/>
+                  </a:schemeClr>
+                </a:gs>
+                <a:gs pos="60000">
+                  <a:schemeClr val="accent5">
+                    <a:lumMod val="60000"/>
+                    <a:lumOff val="40000"/>
+                    <a:alpha val="0"/>
+                  </a:schemeClr>
+                </a:gs>
+              </a:gsLst>
+              <a:path path="circle">
+                <a:fillToRect r="100000" b="100000"/>
+              </a:path>
+              <a:tileRect l="-100000" t="-100000"/>
+            </a:gradFill>
+            <a:ln w="12700" cap="flat" cmpd="sng" algn="ctr">
+              <a:noFill/>
+              <a:prstDash val="solid"/>
+              <a:miter lim="800000"/>
+            </a:ln>
+            <a:effectLst/>
+          </p:spPr>
+          <p:style>
+            <a:lnRef idx="2">
+              <a:schemeClr val="accent1">
+                <a:shade val="50000"/>
+              </a:schemeClr>
+            </a:lnRef>
+            <a:fillRef idx="1">
+              <a:schemeClr val="accent1"/>
+            </a:fillRef>
+            <a:effectRef idx="0">
+              <a:schemeClr val="accent1"/>
+            </a:effectRef>
+            <a:fontRef idx="minor">
+              <a:schemeClr val="lt1"/>
+            </a:fontRef>
+          </p:style>
+          <p:txBody>
+            <a:bodyPr rtlCol="0" anchor="ctr"/>
+            <a:lstStyle/>
+            <a:p>
+              <a:pPr algn="r"/>
+              <a:endParaRPr lang="en-US"/>
+            </a:p>
+          </p:txBody>
+        </p:sp>
+        <p:sp>
+          <p:nvSpPr>
+            <p:cNvPr id="16" name="Rectangle 15">
+              <a:extLst>
+                <a:ext uri="{FF2B5EF4-FFF2-40B4-BE49-F238E27FC236}">
+                  <a16:creationId xmlns:a16="http://schemas.microsoft.com/office/drawing/2014/main" id="{DFD140CE-7DE2-C88F-5EAE-F45EB69E6A89}"/>
+                </a:ext>
+                <a:ext uri="{C183D7F6-B498-43B3-948B-1728B52AA6E4}">
+                  <adec:decorative xmlns:adec="http://schemas.microsoft.com/office/drawing/2017/decorative" val="1"/>
+                </a:ext>
+              </a:extLst>
+            </p:cNvPr>
+            <p:cNvSpPr/>
+            <p:nvPr>
+              <p:extLst>
+                <p:ext uri="{386F3935-93C4-4BCD-93E2-E3B085C9AB24}">
+                  <p16:designElem xmlns:p16="http://schemas.microsoft.com/office/powerpoint/2015/main" val="1"/>
+                </p:ext>
+              </p:extLst>
+            </p:nvPr>
+          </p:nvSpPr>
+          <p:spPr>
+            <a:xfrm>
+              <a:off x="-19210" y="6723"/>
+              <a:ext cx="3834567" cy="6876300"/>
+            </a:xfrm>
+            <a:prstGeom prst="rect">
+              <a:avLst/>
+            </a:prstGeom>
+            <a:gradFill flip="none" rotWithShape="1">
+              <a:gsLst>
+                <a:gs pos="3000">
+                  <a:schemeClr val="accent2">
+                    <a:lumMod val="60000"/>
+                    <a:lumOff val="40000"/>
+                    <a:alpha val="78000"/>
+                  </a:schemeClr>
+                </a:gs>
+                <a:gs pos="42000">
+                  <a:schemeClr val="accent2">
+                    <a:alpha val="0"/>
+                  </a:schemeClr>
+                </a:gs>
+              </a:gsLst>
+              <a:lin ang="3000000" scaled="0"/>
+              <a:tileRect/>
+            </a:gradFill>
+            <a:ln>
+              <a:noFill/>
+            </a:ln>
+          </p:spPr>
+          <p:style>
+            <a:lnRef idx="2">
+              <a:schemeClr val="accent1">
+                <a:shade val="50000"/>
+              </a:schemeClr>
+            </a:lnRef>
+            <a:fillRef idx="1">
+              <a:schemeClr val="accent1"/>
+            </a:fillRef>
+            <a:effectRef idx="0">
+              <a:schemeClr val="accent1"/>
+            </a:effectRef>
+            <a:fontRef idx="minor">
+              <a:schemeClr val="lt1"/>
+            </a:fontRef>
+          </p:style>
+          <p:txBody>
+            <a:bodyPr rtlCol="0" anchor="ctr"/>
+            <a:lstStyle/>
+            <a:p>
+              <a:pPr algn="ctr"/>
+              <a:endParaRPr lang="en-US"/>
+            </a:p>
+          </p:txBody>
+        </p:sp>
+        <p:sp>
+          <p:nvSpPr>
+            <p:cNvPr id="17" name="Rectangle 16">
+              <a:extLst>
+                <a:ext uri="{FF2B5EF4-FFF2-40B4-BE49-F238E27FC236}">
+                  <a16:creationId xmlns:a16="http://schemas.microsoft.com/office/drawing/2014/main" id="{557E87E3-413F-10EF-63D8-6016E986C966}"/>
+                </a:ext>
+                <a:ext uri="{C183D7F6-B498-43B3-948B-1728B52AA6E4}">
+                  <adec:decorative xmlns:adec="http://schemas.microsoft.com/office/drawing/2017/decorative" val="1"/>
+                </a:ext>
+              </a:extLst>
+            </p:cNvPr>
+            <p:cNvSpPr/>
+            <p:nvPr>
+              <p:extLst>
+                <p:ext uri="{386F3935-93C4-4BCD-93E2-E3B085C9AB24}">
+                  <p16:designElem xmlns:p16="http://schemas.microsoft.com/office/powerpoint/2015/main" val="1"/>
+                </p:ext>
+              </p:extLst>
+            </p:nvPr>
+          </p:nvSpPr>
+          <p:spPr>
+            <a:xfrm rot="16200000">
+              <a:off x="-844601" y="833689"/>
+              <a:ext cx="6872341" cy="5204961"/>
+            </a:xfrm>
+            <a:prstGeom prst="rect">
+              <a:avLst/>
+            </a:prstGeom>
+            <a:gradFill>
+              <a:gsLst>
+                <a:gs pos="0">
+                  <a:schemeClr val="accent5">
+                    <a:alpha val="86000"/>
+                  </a:schemeClr>
+                </a:gs>
+                <a:gs pos="57000">
+                  <a:schemeClr val="accent2">
+                    <a:alpha val="0"/>
+                  </a:schemeClr>
+                </a:gs>
+              </a:gsLst>
+              <a:lin ang="13800000" scaled="0"/>
+            </a:gradFill>
+            <a:ln>
+              <a:noFill/>
+            </a:ln>
+          </p:spPr>
+          <p:style>
+            <a:lnRef idx="2">
+              <a:schemeClr val="accent1">
+                <a:shade val="50000"/>
+              </a:schemeClr>
+            </a:lnRef>
+            <a:fillRef idx="1">
+              <a:schemeClr val="accent1"/>
+            </a:fillRef>
+            <a:effectRef idx="0">
+              <a:schemeClr val="accent1"/>
+            </a:effectRef>
+            <a:fontRef idx="minor">
+              <a:schemeClr val="lt1"/>
+            </a:fontRef>
+          </p:style>
+          <p:txBody>
+            <a:bodyPr rtlCol="0" anchor="ctr"/>
+            <a:lstStyle/>
+            <a:p>
+              <a:pPr algn="ctr"/>
+              <a:endParaRPr lang="en-US"/>
+            </a:p>
+          </p:txBody>
+        </p:sp>
+      </p:grpSp>
       <p:sp>
         <p:nvSpPr>
           <p:cNvPr id="2" name="Title 1">
@@ -6767,18 +7111,25 @@
         </p:nvSpPr>
         <p:spPr>
           <a:xfrm>
-            <a:off x="1346886" y="-12357"/>
-            <a:ext cx="10515600" cy="1325563"/>
+            <a:off x="755484" y="739835"/>
+            <a:ext cx="3702580" cy="1616203"/>
           </a:xfrm>
         </p:spPr>
         <p:txBody>
-          <a:bodyPr>
+          <a:bodyPr vert="horz" lIns="91440" tIns="45720" rIns="91440" bIns="45720" rtlCol="0" anchor="b">
             <a:normAutofit/>
           </a:bodyPr>
           <a:lstStyle/>
           <a:p>
             <a:r>
-              <a:rPr lang="en-US" sz="3600" dirty="0"/>
+              <a:rPr lang="en-US" sz="3200" kern="1200">
+                <a:solidFill>
+                  <a:srgbClr val="FFFFFF"/>
+                </a:solidFill>
+                <a:latin typeface="+mj-lt"/>
+                <a:ea typeface="+mj-ea"/>
+                <a:cs typeface="+mj-cs"/>
+              </a:rPr>
               <a:t>How is Asbestos treated ?</a:t>
             </a:r>
           </a:p>
@@ -6798,65 +7149,124 @@
         </p:nvSpPr>
         <p:spPr>
           <a:xfrm>
-            <a:off x="8302938" y="1128540"/>
-            <a:ext cx="3583459" cy="3416320"/>
+            <a:off x="755484" y="2459116"/>
+            <a:ext cx="3702579" cy="3524823"/>
           </a:xfrm>
           <a:prstGeom prst="rect">
             <a:avLst/>
           </a:prstGeom>
-          <a:noFill/>
         </p:spPr>
         <p:txBody>
-          <a:bodyPr wrap="square" rtlCol="0">
-            <a:spAutoFit/>
+          <a:bodyPr vert="horz" lIns="91440" tIns="45720" rIns="91440" bIns="45720" rtlCol="0">
+            <a:normAutofit/>
           </a:bodyPr>
           <a:lstStyle/>
           <a:p>
-            <a:pPr marL="285750" indent="-285750">
+            <a:pPr marL="285750" indent="-228600">
+              <a:lnSpc>
+                <a:spcPct val="90000"/>
+              </a:lnSpc>
+              <a:spcAft>
+                <a:spcPts val="600"/>
+              </a:spcAft>
               <a:buFont typeface="Arial" panose="020B0604020202020204" pitchFamily="34" charset="0"/>
               <a:buChar char="•"/>
             </a:pPr>
             <a:r>
-              <a:rPr lang="en-US" dirty="0"/>
+              <a:rPr lang="en-US" sz="1900">
+                <a:solidFill>
+                  <a:srgbClr val="FFFFFF"/>
+                </a:solidFill>
+              </a:rPr>
               <a:t>We observe that Asbestos is especially harmful for the environment since it is </a:t>
             </a:r>
             <a:r>
-              <a:rPr lang="en-US" b="1" dirty="0"/>
+              <a:rPr lang="en-US" sz="1900" b="1">
+                <a:solidFill>
+                  <a:srgbClr val="FFFFFF"/>
+                </a:solidFill>
+              </a:rPr>
               <a:t>non-biodegradable in nature.</a:t>
             </a:r>
           </a:p>
           <a:p>
-            <a:pPr marL="285750" indent="-285750">
+            <a:pPr marL="285750" indent="-228600">
+              <a:lnSpc>
+                <a:spcPct val="90000"/>
+              </a:lnSpc>
+              <a:spcAft>
+                <a:spcPts val="600"/>
+              </a:spcAft>
               <a:buFont typeface="Arial" panose="020B0604020202020204" pitchFamily="34" charset="0"/>
               <a:buChar char="•"/>
             </a:pPr>
             <a:r>
-              <a:rPr lang="en-US" dirty="0"/>
+              <a:rPr lang="en-US" sz="1900">
+                <a:solidFill>
+                  <a:srgbClr val="FFFFFF"/>
+                </a:solidFill>
+              </a:rPr>
               <a:t>This inevitable leads to bigger landfills and consequent rise in </a:t>
             </a:r>
             <a:r>
-              <a:rPr lang="en-US" b="1" dirty="0"/>
+              <a:rPr lang="en-US" sz="1900" b="1">
+                <a:solidFill>
+                  <a:srgbClr val="FFFFFF"/>
+                </a:solidFill>
+              </a:rPr>
               <a:t>land, water and air pollution.</a:t>
             </a:r>
           </a:p>
           <a:p>
-            <a:endParaRPr lang="en-US" dirty="0"/>
-          </a:p>
-          <a:p>
-            <a:pPr marL="285750" indent="-285750">
+            <a:pPr indent="-228600">
+              <a:lnSpc>
+                <a:spcPct val="90000"/>
+              </a:lnSpc>
+              <a:spcAft>
+                <a:spcPts val="600"/>
+              </a:spcAft>
               <a:buFont typeface="Arial" panose="020B0604020202020204" pitchFamily="34" charset="0"/>
               <a:buChar char="•"/>
             </a:pPr>
-            <a:r>
-              <a:rPr lang="en-US" dirty="0"/>
+            <a:endParaRPr lang="en-US" sz="1900">
+              <a:solidFill>
+                <a:srgbClr val="FFFFFF"/>
+              </a:solidFill>
+            </a:endParaRPr>
+          </a:p>
+          <a:p>
+            <a:pPr marL="285750" indent="-228600">
+              <a:lnSpc>
+                <a:spcPct val="90000"/>
+              </a:lnSpc>
+              <a:spcAft>
+                <a:spcPts val="600"/>
+              </a:spcAft>
+              <a:buFont typeface="Arial" panose="020B0604020202020204" pitchFamily="34" charset="0"/>
+              <a:buChar char="•"/>
+            </a:pPr>
+            <a:r>
+              <a:rPr lang="en-US" sz="1900">
+                <a:solidFill>
+                  <a:srgbClr val="FFFFFF"/>
+                </a:solidFill>
+              </a:rPr>
               <a:t>Asbestos is additionally </a:t>
             </a:r>
             <a:r>
-              <a:rPr lang="en-US" b="1" dirty="0"/>
+              <a:rPr lang="en-US" sz="1900" b="1">
+                <a:solidFill>
+                  <a:srgbClr val="FFFFFF"/>
+                </a:solidFill>
+              </a:rPr>
               <a:t>carcinogenic</a:t>
             </a:r>
             <a:r>
-              <a:rPr lang="en-US" dirty="0"/>
+              <a:rPr lang="en-US" sz="1900">
+                <a:solidFill>
+                  <a:srgbClr val="FFFFFF"/>
+                </a:solidFill>
+              </a:rPr>
               <a:t> in nature, thereby causing direct health risks to lives.</a:t>
             </a:r>
           </a:p>
@@ -6886,9 +7296,12 @@
         </p:blipFill>
         <p:spPr>
           <a:xfrm>
-            <a:off x="1145517" y="991930"/>
-            <a:ext cx="7181331" cy="5129522"/>
+            <a:off x="5325681" y="1224148"/>
+            <a:ext cx="6445095" cy="4608241"/>
           </a:xfrm>
+          <a:prstGeom prst="rect">
+            <a:avLst/>
+          </a:prstGeom>
         </p:spPr>
       </p:pic>
     </p:spTree>
@@ -7853,7 +8266,7 @@
             <p:ph idx="1"/>
             <p:extLst>
               <p:ext uri="{D42A27DB-BD31-4B8C-83A1-F6EECF244321}">
-                <p14:modId xmlns:p14="http://schemas.microsoft.com/office/powerpoint/2010/main" val="1597054150"/>
+                <p14:modId xmlns:p14="http://schemas.microsoft.com/office/powerpoint/2010/main" val="364297147"/>
               </p:ext>
             </p:extLst>
           </p:nvPr>
@@ -8534,31 +8947,31 @@
               <a:buChar char="•"/>
             </a:pPr>
             <a:r>
-              <a:rPr lang="en-US" sz="2000" b="1"/>
+              <a:rPr lang="en-US" sz="2000" b="1" dirty="0"/>
               <a:t>WA</a:t>
             </a:r>
             <a:r>
-              <a:rPr lang="en-US" sz="2000"/>
+              <a:rPr lang="en-US" sz="2000" dirty="0"/>
               <a:t> leads the waste generation by state with </a:t>
             </a:r>
             <a:r>
-              <a:rPr lang="en-US" sz="2000" b="1"/>
+              <a:rPr lang="en-US" sz="2000" b="1" dirty="0"/>
               <a:t>37 % </a:t>
             </a:r>
             <a:r>
-              <a:rPr lang="en-US" sz="2000"/>
+              <a:rPr lang="en-US" sz="2000" dirty="0"/>
               <a:t>of the national waste produced followed by </a:t>
             </a:r>
             <a:r>
-              <a:rPr lang="en-US" sz="2000" b="1"/>
+              <a:rPr lang="en-US" sz="2000" b="1" dirty="0"/>
               <a:t>NSW (22 %) </a:t>
             </a:r>
             <a:r>
-              <a:rPr lang="en-US" sz="2000"/>
+              <a:rPr lang="en-US" sz="2000" dirty="0"/>
               <a:t>and </a:t>
             </a:r>
             <a:r>
-              <a:rPr lang="en-US" sz="2000" b="1"/>
+              <a:rPr lang="en-US" sz="2000" b="1" dirty="0"/>
               <a:t>QLD (17.4 %).</a:t>
             </a:r>
           </a:p>
@@ -8573,7 +8986,7 @@
               <a:buFont typeface="Arial" panose="020B0604020202020204" pitchFamily="34" charset="0"/>
               <a:buChar char="•"/>
             </a:pPr>
-            <a:endParaRPr lang="en-US" sz="2000" b="1"/>
+            <a:endParaRPr lang="en-US" sz="2000" b="1" dirty="0"/>
           </a:p>
           <a:p>
             <a:pPr marL="285750" indent="-228600">
@@ -8588,11 +9001,19 @@
             </a:pPr>
             <a:r>
               <a:rPr lang="en-US" sz="2000"/>
-              <a:t>Despite a population lower than QLD and NSW, it is interesting to note the high generation of waste </a:t>
-            </a:r>
-            <a:r>
-              <a:rPr lang="en-US" sz="2000" b="1"/>
-              <a:t>(Approx. 1500 Mega Tonnes).</a:t>
+              <a:t>Despite a population lower than QLD and NSW, it is interesting to note the high generation of waste by WA. </a:t>
+            </a:r>
+            <a:r>
+              <a:rPr lang="en-US" sz="2000" b="1" dirty="0"/>
+              <a:t>(Approx. 1500 Mega </a:t>
+            </a:r>
+            <a:r>
+              <a:rPr lang="en-US" sz="2000" b="1" dirty="0" err="1"/>
+              <a:t>Tonnes</a:t>
+            </a:r>
+            <a:r>
+              <a:rPr lang="en-US" sz="2000" b="1" dirty="0"/>
+              <a:t>).</a:t>
             </a:r>
           </a:p>
         </p:txBody>

</xml_diff>